<commit_message>
Emphsaize initial transient state is being fit
1. Add it into the figure more prominantly
2. Identify it as one of the outputs
3. Mention that we use a starting guess for it
</commit_message>
<xml_diff>
--- a/docs/figure-pptx/explain-offline.pptx
+++ b/docs/figure-pptx/explain-offline.pptx
@@ -197,7 +197,7 @@
           <a:p>
             <a:fld id="{EEE1F527-089D-457B-865D-1FD4CCD90545}" type="datetimeFigureOut">
               <a:rPr lang="en-US" smtClean="0"/>
-              <a:t>9/18/2024</a:t>
+              <a:t>9/23/2024</a:t>
             </a:fld>
             <a:endParaRPr lang="en-US"/>
           </a:p>
@@ -682,7 +682,7 @@
           <a:p>
             <a:fld id="{5700AFFE-FBA7-4C72-98C2-EBFAFBD34EC6}" type="datetimeFigureOut">
               <a:rPr lang="en-US" smtClean="0"/>
-              <a:t>9/18/2024</a:t>
+              <a:t>9/23/2024</a:t>
             </a:fld>
             <a:endParaRPr lang="en-US"/>
           </a:p>
@@ -852,7 +852,7 @@
           <a:p>
             <a:fld id="{5700AFFE-FBA7-4C72-98C2-EBFAFBD34EC6}" type="datetimeFigureOut">
               <a:rPr lang="en-US" smtClean="0"/>
-              <a:t>9/18/2024</a:t>
+              <a:t>9/23/2024</a:t>
             </a:fld>
             <a:endParaRPr lang="en-US"/>
           </a:p>
@@ -1032,7 +1032,7 @@
           <a:p>
             <a:fld id="{5700AFFE-FBA7-4C72-98C2-EBFAFBD34EC6}" type="datetimeFigureOut">
               <a:rPr lang="en-US" smtClean="0"/>
-              <a:t>9/18/2024</a:t>
+              <a:t>9/23/2024</a:t>
             </a:fld>
             <a:endParaRPr lang="en-US"/>
           </a:p>
@@ -1202,7 +1202,7 @@
           <a:p>
             <a:fld id="{5700AFFE-FBA7-4C72-98C2-EBFAFBD34EC6}" type="datetimeFigureOut">
               <a:rPr lang="en-US" smtClean="0"/>
-              <a:t>9/18/2024</a:t>
+              <a:t>9/23/2024</a:t>
             </a:fld>
             <a:endParaRPr lang="en-US"/>
           </a:p>
@@ -1448,7 +1448,7 @@
           <a:p>
             <a:fld id="{5700AFFE-FBA7-4C72-98C2-EBFAFBD34EC6}" type="datetimeFigureOut">
               <a:rPr lang="en-US" smtClean="0"/>
-              <a:t>9/18/2024</a:t>
+              <a:t>9/23/2024</a:t>
             </a:fld>
             <a:endParaRPr lang="en-US"/>
           </a:p>
@@ -1680,7 +1680,7 @@
           <a:p>
             <a:fld id="{5700AFFE-FBA7-4C72-98C2-EBFAFBD34EC6}" type="datetimeFigureOut">
               <a:rPr lang="en-US" smtClean="0"/>
-              <a:t>9/18/2024</a:t>
+              <a:t>9/23/2024</a:t>
             </a:fld>
             <a:endParaRPr lang="en-US"/>
           </a:p>
@@ -2047,7 +2047,7 @@
           <a:p>
             <a:fld id="{5700AFFE-FBA7-4C72-98C2-EBFAFBD34EC6}" type="datetimeFigureOut">
               <a:rPr lang="en-US" smtClean="0"/>
-              <a:t>9/18/2024</a:t>
+              <a:t>9/23/2024</a:t>
             </a:fld>
             <a:endParaRPr lang="en-US"/>
           </a:p>
@@ -2165,7 +2165,7 @@
           <a:p>
             <a:fld id="{5700AFFE-FBA7-4C72-98C2-EBFAFBD34EC6}" type="datetimeFigureOut">
               <a:rPr lang="en-US" smtClean="0"/>
-              <a:t>9/18/2024</a:t>
+              <a:t>9/23/2024</a:t>
             </a:fld>
             <a:endParaRPr lang="en-US"/>
           </a:p>
@@ -2260,7 +2260,7 @@
           <a:p>
             <a:fld id="{5700AFFE-FBA7-4C72-98C2-EBFAFBD34EC6}" type="datetimeFigureOut">
               <a:rPr lang="en-US" smtClean="0"/>
-              <a:t>9/18/2024</a:t>
+              <a:t>9/23/2024</a:t>
             </a:fld>
             <a:endParaRPr lang="en-US"/>
           </a:p>
@@ -2537,7 +2537,7 @@
           <a:p>
             <a:fld id="{5700AFFE-FBA7-4C72-98C2-EBFAFBD34EC6}" type="datetimeFigureOut">
               <a:rPr lang="en-US" smtClean="0"/>
-              <a:t>9/18/2024</a:t>
+              <a:t>9/23/2024</a:t>
             </a:fld>
             <a:endParaRPr lang="en-US"/>
           </a:p>
@@ -2794,7 +2794,7 @@
           <a:p>
             <a:fld id="{5700AFFE-FBA7-4C72-98C2-EBFAFBD34EC6}" type="datetimeFigureOut">
               <a:rPr lang="en-US" smtClean="0"/>
-              <a:t>9/18/2024</a:t>
+              <a:t>9/23/2024</a:t>
             </a:fld>
             <a:endParaRPr lang="en-US"/>
           </a:p>
@@ -3007,7 +3007,7 @@
           <a:p>
             <a:fld id="{5700AFFE-FBA7-4C72-98C2-EBFAFBD34EC6}" type="datetimeFigureOut">
               <a:rPr lang="en-US" smtClean="0"/>
-              <a:t>9/18/2024</a:t>
+              <a:t>9/23/2024</a:t>
             </a:fld>
             <a:endParaRPr lang="en-US"/>
           </a:p>
@@ -4203,7 +4203,7 @@
         <p:spPr>
           <a:xfrm>
             <a:off x="67930" y="577374"/>
-            <a:ext cx="824265" cy="215444"/>
+            <a:ext cx="881973" cy="215444"/>
           </a:xfrm>
           <a:prstGeom prst="rect">
             <a:avLst/>
@@ -4222,7 +4222,23 @@
                 <a:ea typeface="Cascadia Code" panose="020B0609020000020004" pitchFamily="49" charset="0"/>
                 <a:cs typeface="Arial" panose="020B0604020202020204" pitchFamily="34" charset="0"/>
               </a:rPr>
-              <a:t>(SOC, ASOH)</a:t>
+              <a:t>(SOC</a:t>
+            </a:r>
+            <a:r>
+              <a:rPr lang="en-US" sz="800" baseline="-25000" dirty="0">
+                <a:latin typeface="Arial" panose="020B0604020202020204" pitchFamily="34" charset="0"/>
+                <a:ea typeface="Cascadia Code" panose="020B0609020000020004" pitchFamily="49" charset="0"/>
+                <a:cs typeface="Arial" panose="020B0604020202020204" pitchFamily="34" charset="0"/>
+              </a:rPr>
+              <a:t>0</a:t>
+            </a:r>
+            <a:r>
+              <a:rPr lang="en-US" sz="800" dirty="0">
+                <a:latin typeface="Arial" panose="020B0604020202020204" pitchFamily="34" charset="0"/>
+                <a:ea typeface="Cascadia Code" panose="020B0609020000020004" pitchFamily="49" charset="0"/>
+                <a:cs typeface="Arial" panose="020B0604020202020204" pitchFamily="34" charset="0"/>
+              </a:rPr>
+              <a:t>, ASOH)</a:t>
             </a:r>
           </a:p>
         </p:txBody>
@@ -4403,8 +4419,8 @@
           </a:fontRef>
         </p:style>
       </p:cxnSp>
-      <mc:AlternateContent xmlns:mc="http://schemas.openxmlformats.org/markup-compatibility/2006">
-        <mc:Choice xmlns:a14="http://schemas.microsoft.com/office/drawing/2010/main" Requires="a14">
+      <mc:AlternateContent xmlns:mc="http://schemas.openxmlformats.org/markup-compatibility/2006" xmlns:a14="http://schemas.microsoft.com/office/drawing/2010/main">
+        <mc:Choice Requires="a14">
           <p:sp>
             <p:nvSpPr>
               <p:cNvPr id="55" name="TextBox 54">
@@ -4419,8 +4435,8 @@
             </p:nvSpPr>
             <p:spPr>
               <a:xfrm>
-                <a:off x="1513312" y="204767"/>
-                <a:ext cx="271100" cy="215444"/>
+                <a:off x="1385361" y="200353"/>
+                <a:ext cx="510396" cy="215444"/>
               </a:xfrm>
               <a:prstGeom prst="rect">
                 <a:avLst/>
@@ -4446,7 +4462,62 @@
                           <a:ea typeface="Cascadia Code" panose="020B0609020000020004" pitchFamily="49" charset="0"/>
                           <a:cs typeface="Arial" panose="020B0604020202020204" pitchFamily="34" charset="0"/>
                         </a:rPr>
-                        <m:t>𝑥</m:t>
+                        <m:t>(</m:t>
+                      </m:r>
+                      <m:sSub>
+                        <m:sSubPr>
+                          <m:ctrlPr>
+                            <a:rPr lang="en-US" sz="800" b="0" i="1" smtClean="0">
+                              <a:latin typeface="Cambria Math" panose="02040503050406030204" pitchFamily="18" charset="0"/>
+                              <a:ea typeface="Cascadia Code" panose="020B0609020000020004" pitchFamily="49" charset="0"/>
+                              <a:cs typeface="Arial" panose="020B0604020202020204" pitchFamily="34" charset="0"/>
+                            </a:rPr>
+                          </m:ctrlPr>
+                        </m:sSubPr>
+                        <m:e>
+                          <m:r>
+                            <a:rPr lang="en-US" sz="800" b="0" i="1" smtClean="0">
+                              <a:latin typeface="Cambria Math" panose="02040503050406030204" pitchFamily="18" charset="0"/>
+                              <a:ea typeface="Cascadia Code" panose="020B0609020000020004" pitchFamily="49" charset="0"/>
+                              <a:cs typeface="Arial" panose="020B0604020202020204" pitchFamily="34" charset="0"/>
+                            </a:rPr>
+                            <m:t>h</m:t>
+                          </m:r>
+                        </m:e>
+                        <m:sub>
+                          <m:r>
+                            <a:rPr lang="en-US" sz="800" b="0" i="1" smtClean="0">
+                              <a:latin typeface="Cambria Math" panose="02040503050406030204" pitchFamily="18" charset="0"/>
+                              <a:ea typeface="Cascadia Code" panose="020B0609020000020004" pitchFamily="49" charset="0"/>
+                              <a:cs typeface="Arial" panose="020B0604020202020204" pitchFamily="34" charset="0"/>
+                            </a:rPr>
+                            <m:t>0</m:t>
+                          </m:r>
+                        </m:sub>
+                      </m:sSub>
+                      <m:r>
+                        <a:rPr lang="en-US" sz="800" b="0" i="1" smtClean="0">
+                          <a:latin typeface="Cambria Math" panose="02040503050406030204" pitchFamily="18" charset="0"/>
+                          <a:ea typeface="Cascadia Code" panose="020B0609020000020004" pitchFamily="49" charset="0"/>
+                          <a:cs typeface="Arial" panose="020B0604020202020204" pitchFamily="34" charset="0"/>
+                        </a:rPr>
+                        <m:t>;</m:t>
+                      </m:r>
+                      <m:r>
+                        <a:rPr lang="en-US" sz="800" b="0" i="1" smtClean="0">
+                          <a:latin typeface="Cambria Math" panose="02040503050406030204" pitchFamily="18" charset="0"/>
+                          <a:ea typeface="Cascadia Code" panose="020B0609020000020004" pitchFamily="49" charset="0"/>
+                          <a:cs typeface="Arial" panose="020B0604020202020204" pitchFamily="34" charset="0"/>
+                        </a:rPr>
+                        <m:t>𝜃</m:t>
+                      </m:r>
+                      <m:r>
+                        <a:rPr lang="en-US" sz="800" b="0" i="1" smtClean="0">
+                          <a:latin typeface="Cambria Math" panose="02040503050406030204" pitchFamily="18" charset="0"/>
+                          <a:ea typeface="Cascadia Code" panose="020B0609020000020004" pitchFamily="49" charset="0"/>
+                          <a:cs typeface="Arial" panose="020B0604020202020204" pitchFamily="34" charset="0"/>
+                        </a:rPr>
+                        <m:t>)</m:t>
                       </m:r>
                     </m:oMath>
                   </m:oMathPara>
@@ -4460,7 +4531,7 @@
             </p:txBody>
           </p:sp>
         </mc:Choice>
-        <mc:Fallback>
+        <mc:Fallback xmlns="">
           <p:sp>
             <p:nvSpPr>
               <p:cNvPr id="55" name="TextBox 54">
@@ -4477,8 +4548,8 @@
             </p:nvSpPr>
             <p:spPr>
               <a:xfrm>
-                <a:off x="1513312" y="204767"/>
-                <a:ext cx="271100" cy="215444"/>
+                <a:off x="1385361" y="200353"/>
+                <a:ext cx="510396" cy="215444"/>
               </a:xfrm>
               <a:prstGeom prst="rect">
                 <a:avLst/>
@@ -4486,7 +4557,7 @@
               <a:blipFill>
                 <a:blip r:embed="rId6"/>
                 <a:stretch>
-                  <a:fillRect/>
+                  <a:fillRect b="-2857"/>
                 </a:stretch>
               </a:blipFill>
             </p:spPr>
@@ -4505,8 +4576,8 @@
           </p:sp>
         </mc:Fallback>
       </mc:AlternateContent>
-      <mc:AlternateContent xmlns:mc="http://schemas.openxmlformats.org/markup-compatibility/2006">
-        <mc:Choice xmlns:a14="http://schemas.microsoft.com/office/drawing/2010/main" Requires="a14">
+      <mc:AlternateContent xmlns:mc="http://schemas.openxmlformats.org/markup-compatibility/2006" xmlns:a14="http://schemas.microsoft.com/office/drawing/2010/main">
+        <mc:Choice Requires="a14">
           <p:sp>
             <p:nvSpPr>
               <p:cNvPr id="56" name="TextBox 55">
@@ -4625,7 +4696,7 @@
             </p:txBody>
           </p:sp>
         </mc:Choice>
-        <mc:Fallback>
+        <mc:Fallback xmlns="">
           <p:sp>
             <p:nvSpPr>
               <p:cNvPr id="56" name="TextBox 55">

</xml_diff>